<commit_message>
add data and update hw for TA
</commit_message>
<xml_diff>
--- a/resources/hw/genomic-data-visualization-HW_0.pptx
+++ b/resources/hw/genomic-data-visualization-HW_0.pptx
@@ -284,7 +284,7 @@
           <a:p>
             <a:fld id="{3B49BF8B-8FD1-1748-B518-B651293E6FA0}" type="datetimeFigureOut">
               <a:rPr lang="en-US" smtClean="0"/>
-              <a:t>1/13/25</a:t>
+              <a:t>1/5/26</a:t>
             </a:fld>
             <a:endParaRPr lang="en-US"/>
           </a:p>
@@ -454,7 +454,7 @@
           <a:p>
             <a:fld id="{3B49BF8B-8FD1-1748-B518-B651293E6FA0}" type="datetimeFigureOut">
               <a:rPr lang="en-US" smtClean="0"/>
-              <a:t>1/13/25</a:t>
+              <a:t>1/5/26</a:t>
             </a:fld>
             <a:endParaRPr lang="en-US"/>
           </a:p>
@@ -634,7 +634,7 @@
           <a:p>
             <a:fld id="{3B49BF8B-8FD1-1748-B518-B651293E6FA0}" type="datetimeFigureOut">
               <a:rPr lang="en-US" smtClean="0"/>
-              <a:t>1/13/25</a:t>
+              <a:t>1/5/26</a:t>
             </a:fld>
             <a:endParaRPr lang="en-US"/>
           </a:p>
@@ -804,7 +804,7 @@
           <a:p>
             <a:fld id="{3B49BF8B-8FD1-1748-B518-B651293E6FA0}" type="datetimeFigureOut">
               <a:rPr lang="en-US" smtClean="0"/>
-              <a:t>1/13/25</a:t>
+              <a:t>1/5/26</a:t>
             </a:fld>
             <a:endParaRPr lang="en-US"/>
           </a:p>
@@ -1064,7 +1064,7 @@
           <a:p>
             <a:fld id="{3B49BF8B-8FD1-1748-B518-B651293E6FA0}" type="datetimeFigureOut">
               <a:rPr lang="en-US" smtClean="0"/>
-              <a:t>1/13/25</a:t>
+              <a:t>1/5/26</a:t>
             </a:fld>
             <a:endParaRPr lang="en-US"/>
           </a:p>
@@ -1296,7 +1296,7 @@
           <a:p>
             <a:fld id="{3B49BF8B-8FD1-1748-B518-B651293E6FA0}" type="datetimeFigureOut">
               <a:rPr lang="en-US" smtClean="0"/>
-              <a:t>1/13/25</a:t>
+              <a:t>1/5/26</a:t>
             </a:fld>
             <a:endParaRPr lang="en-US"/>
           </a:p>
@@ -1651,7 +1651,7 @@
           <a:p>
             <a:fld id="{3B49BF8B-8FD1-1748-B518-B651293E6FA0}" type="datetimeFigureOut">
               <a:rPr lang="en-US" smtClean="0"/>
-              <a:t>1/13/25</a:t>
+              <a:t>1/5/26</a:t>
             </a:fld>
             <a:endParaRPr lang="en-US"/>
           </a:p>
@@ -1792,7 +1792,7 @@
           <a:p>
             <a:fld id="{3B49BF8B-8FD1-1748-B518-B651293E6FA0}" type="datetimeFigureOut">
               <a:rPr lang="en-US" smtClean="0"/>
-              <a:t>1/13/25</a:t>
+              <a:t>1/5/26</a:t>
             </a:fld>
             <a:endParaRPr lang="en-US"/>
           </a:p>
@@ -1887,7 +1887,7 @@
           <a:p>
             <a:fld id="{3B49BF8B-8FD1-1748-B518-B651293E6FA0}" type="datetimeFigureOut">
               <a:rPr lang="en-US" smtClean="0"/>
-              <a:t>1/13/25</a:t>
+              <a:t>1/5/26</a:t>
             </a:fld>
             <a:endParaRPr lang="en-US"/>
           </a:p>
@@ -2244,7 +2244,7 @@
           <a:p>
             <a:fld id="{3B49BF8B-8FD1-1748-B518-B651293E6FA0}" type="datetimeFigureOut">
               <a:rPr lang="en-US" smtClean="0"/>
-              <a:t>1/13/25</a:t>
+              <a:t>1/5/26</a:t>
             </a:fld>
             <a:endParaRPr lang="en-US"/>
           </a:p>
@@ -2562,7 +2562,7 @@
           <a:p>
             <a:fld id="{3B49BF8B-8FD1-1748-B518-B651293E6FA0}" type="datetimeFigureOut">
               <a:rPr lang="en-US" smtClean="0"/>
-              <a:t>1/13/25</a:t>
+              <a:t>1/5/26</a:t>
             </a:fld>
             <a:endParaRPr lang="en-US"/>
           </a:p>
@@ -2807,7 +2807,7 @@
           <a:p>
             <a:fld id="{3B49BF8B-8FD1-1748-B518-B651293E6FA0}" type="datetimeFigureOut">
               <a:rPr lang="en-US" smtClean="0"/>
-              <a:t>1/13/25</a:t>
+              <a:t>1/5/26</a:t>
             </a:fld>
             <a:endParaRPr lang="en-US"/>
           </a:p>
@@ -3313,7 +3313,7 @@
           <a:p>
             <a:r>
               <a:rPr lang="en-US" dirty="0"/>
-              <a:t>Due Thursday (Midnight Baltimore Time)</a:t>
+              <a:t>Due Wednesday (Midnight Baltimore Time)</a:t>
             </a:r>
           </a:p>
         </p:txBody>
@@ -3696,12 +3696,8 @@
               <a:rPr lang="en-US" sz="2000" dirty="0"/>
             </a:br>
             <a:r>
-              <a:rPr lang="en-US" sz="2000"/>
-              <a:t>Due Wednesday </a:t>
-            </a:r>
-            <a:r>
               <a:rPr lang="en-US" sz="2000" dirty="0"/>
-              <a:t>(Midnight Baltimore Time)</a:t>
+              <a:t>Due WEDNESDAY (Midnight Baltimore Time)</a:t>
             </a:r>
           </a:p>
         </p:txBody>
@@ -3820,7 +3816,7 @@
                 </a:solidFill>
                 <a:hlinkClick r:id="rId3"/>
               </a:rPr>
-              <a:t>https://github.com/JEFworks-Lab/genomic-data-visualization-2025</a:t>
+              <a:t>https://github.com/JEFworks-Lab/genomic-data-visualization-2026</a:t>
             </a:r>
             <a:r>
               <a:rPr lang="en-US" sz="1500" dirty="0">
@@ -4124,11 +4120,11 @@
               <a:rPr lang="en-US" dirty="0">
                 <a:hlinkClick r:id="rId2"/>
               </a:rPr>
-              <a:t>https://github.com/JEFworks-Lab/genomic-data-visualization-2025</a:t>
+              <a:t>https://github.com/JEFworks-Lab/genomic-data-visualization-2026</a:t>
             </a:r>
             <a:r>
               <a:rPr lang="en-US" dirty="0"/>
-              <a:t>    </a:t>
+              <a:t> </a:t>
             </a:r>
           </a:p>
         </p:txBody>
@@ -4278,17 +4274,17 @@
         </p:spPr>
         <p:txBody>
           <a:bodyPr vert="horz" lIns="274320" tIns="182880" rIns="274320" bIns="182880" rtlCol="0" anchor="ctr" anchorCtr="1">
-            <a:normAutofit/>
+            <a:normAutofit fontScale="90000"/>
           </a:bodyPr>
           <a:lstStyle/>
           <a:p>
             <a:r>
-              <a:rPr lang="en-US" sz="2400">
+              <a:rPr lang="en-US" sz="2400" dirty="0">
                 <a:solidFill>
                   <a:srgbClr val="262626"/>
                 </a:solidFill>
               </a:rPr>
-              <a:t>3. Clone the repo to your computer</a:t>
+              <a:t>3. Optional: Clone the repo to your computer</a:t>
             </a:r>
           </a:p>
         </p:txBody>

</xml_diff>